<commit_message>
Slight change to PPT slides
</commit_message>
<xml_diff>
--- a/Documents/IoT With Satori.pptx
+++ b/Documents/IoT With Satori.pptx
@@ -10621,6 +10621,17 @@
             </a:r>
           </a:p>
           <a:p>
+            <a:r>
+              <a:rPr lang="en-US" sz="4400" dirty="0">
+                <a:solidFill>
+                  <a:schemeClr val="tx1"/>
+                </a:solidFill>
+                <a:latin typeface="Adobe Caslon Pro" panose="0205050205050A020403"/>
+              </a:rPr>
+              <a:t>Try and build the rest of the application.</a:t>
+            </a:r>
+          </a:p>
+          <a:p>
             <a:pPr lvl="2"/>
             <a:endParaRPr lang="en-US" sz="4400" dirty="0">
               <a:solidFill>
@@ -11067,6 +11078,17 @@
                 </a:solidFill>
                 <a:latin typeface="Adobe Caslon Pro" panose="0205050205050A020403"/>
               </a:rPr>
+              <a:t>Getting ready for the opportunities that IoT presents.</a:t>
+            </a:r>
+          </a:p>
+          <a:p>
+            <a:r>
+              <a:rPr lang="en-US" sz="3600" dirty="0">
+                <a:solidFill>
+                  <a:schemeClr val="tx1"/>
+                </a:solidFill>
+                <a:latin typeface="Adobe Caslon Pro" panose="0205050205050A020403"/>
+              </a:rPr>
               <a:t>Tired of working with Sandboxes</a:t>
             </a:r>
           </a:p>
@@ -11079,17 +11101,6 @@
                 <a:latin typeface="Adobe Caslon Pro" panose="0205050205050A020403"/>
               </a:rPr>
               <a:t>Tired of playing with human generated data</a:t>
-            </a:r>
-          </a:p>
-          <a:p>
-            <a:r>
-              <a:rPr lang="en-US" sz="3600" dirty="0">
-                <a:solidFill>
-                  <a:schemeClr val="tx1"/>
-                </a:solidFill>
-                <a:latin typeface="Adobe Caslon Pro" panose="0205050205050A020403"/>
-              </a:rPr>
-              <a:t>Getting ready for the opportunities that IoT presents.</a:t>
             </a:r>
           </a:p>
           <a:p>

</xml_diff>